<commit_message>
Adding more species to intraspecific body size analyses
</commit_message>
<xml_diff>
--- a/RMO body size.pptx
+++ b/RMO body size.pptx
@@ -10,13 +10,14 @@
     <p:sldId id="258" r:id="rId4"/>
     <p:sldId id="259" r:id="rId5"/>
     <p:sldId id="261" r:id="rId6"/>
-    <p:sldId id="260" r:id="rId7"/>
-    <p:sldId id="262" r:id="rId8"/>
-    <p:sldId id="263" r:id="rId9"/>
-    <p:sldId id="264" r:id="rId10"/>
-    <p:sldId id="265" r:id="rId11"/>
-    <p:sldId id="266" r:id="rId12"/>
-    <p:sldId id="267" r:id="rId13"/>
+    <p:sldId id="268" r:id="rId7"/>
+    <p:sldId id="260" r:id="rId8"/>
+    <p:sldId id="262" r:id="rId9"/>
+    <p:sldId id="263" r:id="rId10"/>
+    <p:sldId id="264" r:id="rId11"/>
+    <p:sldId id="265" r:id="rId12"/>
+    <p:sldId id="266" r:id="rId13"/>
+    <p:sldId id="267" r:id="rId14"/>
   </p:sldIdLst>
   <p:sldSz cx="12192000" cy="6858000"/>
   <p:notesSz cx="6858000" cy="9144000"/>
@@ -115,6 +116,11 @@
       </a:defRPr>
     </a:lvl9pPr>
   </p:defaultTextStyle>
+  <p:extLst>
+    <p:ext uri="{EFAFB233-063F-42B5-8137-9DF3F51BA10A}">
+      <p15:sldGuideLst xmlns:p15="http://schemas.microsoft.com/office/powerpoint/2012/main"/>
+    </p:ext>
+  </p:extLst>
 </p:presentation>
 </file>
 
@@ -265,7 +271,7 @@
           <a:p>
             <a:fld id="{5F743669-8948-4F3E-9D48-6FCFF8F7B330}" type="datetimeFigureOut">
               <a:rPr lang="en-US" smtClean="0"/>
-              <a:t>10/28/2021</a:t>
+              <a:t>6/30/2022</a:t>
             </a:fld>
             <a:endParaRPr lang="en-US"/>
           </a:p>
@@ -463,7 +469,7 @@
           <a:p>
             <a:fld id="{5F743669-8948-4F3E-9D48-6FCFF8F7B330}" type="datetimeFigureOut">
               <a:rPr lang="en-US" smtClean="0"/>
-              <a:t>10/28/2021</a:t>
+              <a:t>6/30/2022</a:t>
             </a:fld>
             <a:endParaRPr lang="en-US"/>
           </a:p>
@@ -671,7 +677,7 @@
           <a:p>
             <a:fld id="{5F743669-8948-4F3E-9D48-6FCFF8F7B330}" type="datetimeFigureOut">
               <a:rPr lang="en-US" smtClean="0"/>
-              <a:t>10/28/2021</a:t>
+              <a:t>6/30/2022</a:t>
             </a:fld>
             <a:endParaRPr lang="en-US"/>
           </a:p>
@@ -869,7 +875,7 @@
           <a:p>
             <a:fld id="{5F743669-8948-4F3E-9D48-6FCFF8F7B330}" type="datetimeFigureOut">
               <a:rPr lang="en-US" smtClean="0"/>
-              <a:t>10/28/2021</a:t>
+              <a:t>6/30/2022</a:t>
             </a:fld>
             <a:endParaRPr lang="en-US"/>
           </a:p>
@@ -1144,7 +1150,7 @@
           <a:p>
             <a:fld id="{5F743669-8948-4F3E-9D48-6FCFF8F7B330}" type="datetimeFigureOut">
               <a:rPr lang="en-US" smtClean="0"/>
-              <a:t>10/28/2021</a:t>
+              <a:t>6/30/2022</a:t>
             </a:fld>
             <a:endParaRPr lang="en-US"/>
           </a:p>
@@ -1409,7 +1415,7 @@
           <a:p>
             <a:fld id="{5F743669-8948-4F3E-9D48-6FCFF8F7B330}" type="datetimeFigureOut">
               <a:rPr lang="en-US" smtClean="0"/>
-              <a:t>10/28/2021</a:t>
+              <a:t>6/30/2022</a:t>
             </a:fld>
             <a:endParaRPr lang="en-US"/>
           </a:p>
@@ -1821,7 +1827,7 @@
           <a:p>
             <a:fld id="{5F743669-8948-4F3E-9D48-6FCFF8F7B330}" type="datetimeFigureOut">
               <a:rPr lang="en-US" smtClean="0"/>
-              <a:t>10/28/2021</a:t>
+              <a:t>6/30/2022</a:t>
             </a:fld>
             <a:endParaRPr lang="en-US"/>
           </a:p>
@@ -1962,7 +1968,7 @@
           <a:p>
             <a:fld id="{5F743669-8948-4F3E-9D48-6FCFF8F7B330}" type="datetimeFigureOut">
               <a:rPr lang="en-US" smtClean="0"/>
-              <a:t>10/28/2021</a:t>
+              <a:t>6/30/2022</a:t>
             </a:fld>
             <a:endParaRPr lang="en-US"/>
           </a:p>
@@ -2075,7 +2081,7 @@
           <a:p>
             <a:fld id="{5F743669-8948-4F3E-9D48-6FCFF8F7B330}" type="datetimeFigureOut">
               <a:rPr lang="en-US" smtClean="0"/>
-              <a:t>10/28/2021</a:t>
+              <a:t>6/30/2022</a:t>
             </a:fld>
             <a:endParaRPr lang="en-US"/>
           </a:p>
@@ -2386,7 +2392,7 @@
           <a:p>
             <a:fld id="{5F743669-8948-4F3E-9D48-6FCFF8F7B330}" type="datetimeFigureOut">
               <a:rPr lang="en-US" smtClean="0"/>
-              <a:t>10/28/2021</a:t>
+              <a:t>6/30/2022</a:t>
             </a:fld>
             <a:endParaRPr lang="en-US"/>
           </a:p>
@@ -2674,7 +2680,7 @@
           <a:p>
             <a:fld id="{5F743669-8948-4F3E-9D48-6FCFF8F7B330}" type="datetimeFigureOut">
               <a:rPr lang="en-US" smtClean="0"/>
-              <a:t>10/28/2021</a:t>
+              <a:t>6/30/2022</a:t>
             </a:fld>
             <a:endParaRPr lang="en-US"/>
           </a:p>
@@ -2915,7 +2921,7 @@
           <a:p>
             <a:fld id="{5F743669-8948-4F3E-9D48-6FCFF8F7B330}" type="datetimeFigureOut">
               <a:rPr lang="en-US" smtClean="0"/>
-              <a:t>10/28/2021</a:t>
+              <a:t>6/30/2022</a:t>
             </a:fld>
             <a:endParaRPr lang="en-US"/>
           </a:p>
@@ -3420,6 +3426,154 @@
       </p:grpSpPr>
       <p:sp>
         <p:nvSpPr>
+          <p:cNvPr id="4" name="Title 1">
+            <a:extLst>
+              <a:ext uri="{FF2B5EF4-FFF2-40B4-BE49-F238E27FC236}">
+                <a16:creationId xmlns:a16="http://schemas.microsoft.com/office/drawing/2014/main" id="{5008CCB4-C1A5-434E-BD0C-12975ABE4F13}"/>
+              </a:ext>
+            </a:extLst>
+          </p:cNvPr>
+          <p:cNvSpPr txBox="1">
+            <a:spLocks/>
+          </p:cNvSpPr>
+          <p:nvPr/>
+        </p:nvSpPr>
+        <p:spPr>
+          <a:xfrm>
+            <a:off x="934453" y="0"/>
+            <a:ext cx="10515600" cy="1325563"/>
+          </a:xfrm>
+          <a:prstGeom prst="rect">
+            <a:avLst/>
+          </a:prstGeom>
+        </p:spPr>
+        <p:txBody>
+          <a:bodyPr vert="horz" lIns="91440" tIns="45720" rIns="91440" bIns="45720" rtlCol="0" anchor="ctr">
+            <a:normAutofit/>
+          </a:bodyPr>
+          <a:lstStyle>
+            <a:lvl1pPr algn="l" defTabSz="914400" rtl="0" eaLnBrk="1" latinLnBrk="0" hangingPunct="1">
+              <a:lnSpc>
+                <a:spcPct val="90000"/>
+              </a:lnSpc>
+              <a:spcBef>
+                <a:spcPct val="0"/>
+              </a:spcBef>
+              <a:buNone/>
+              <a:defRPr sz="4400" kern="1200">
+                <a:solidFill>
+                  <a:schemeClr val="tx1"/>
+                </a:solidFill>
+                <a:latin typeface="+mj-lt"/>
+                <a:ea typeface="+mj-ea"/>
+                <a:cs typeface="+mj-cs"/>
+              </a:defRPr>
+            </a:lvl1pPr>
+          </a:lstStyle>
+          <a:p>
+            <a:r>
+              <a:rPr lang="en-US" dirty="0" err="1"/>
+              <a:t>Aubach</a:t>
+            </a:r>
+            <a:r>
+              <a:rPr lang="en-US" dirty="0"/>
+              <a:t> and Bieber Abundances</a:t>
+            </a:r>
+          </a:p>
+        </p:txBody>
+      </p:sp>
+      <p:pic>
+        <p:nvPicPr>
+          <p:cNvPr id="6" name="Picture 5">
+            <a:extLst>
+              <a:ext uri="{FF2B5EF4-FFF2-40B4-BE49-F238E27FC236}">
+                <a16:creationId xmlns:a16="http://schemas.microsoft.com/office/drawing/2014/main" id="{ACF991C9-DCD7-491C-AFD5-66BDF10612BB}"/>
+              </a:ext>
+            </a:extLst>
+          </p:cNvPr>
+          <p:cNvPicPr>
+            <a:picLocks noChangeAspect="1"/>
+          </p:cNvPicPr>
+          <p:nvPr/>
+        </p:nvPicPr>
+        <p:blipFill>
+          <a:blip r:embed="rId2"/>
+          <a:stretch>
+            <a:fillRect/>
+          </a:stretch>
+        </p:blipFill>
+        <p:spPr>
+          <a:xfrm>
+            <a:off x="6522099" y="1553333"/>
+            <a:ext cx="4780547" cy="4773433"/>
+          </a:xfrm>
+          <a:prstGeom prst="rect">
+            <a:avLst/>
+          </a:prstGeom>
+        </p:spPr>
+      </p:pic>
+      <p:pic>
+        <p:nvPicPr>
+          <p:cNvPr id="7" name="Picture 6">
+            <a:extLst>
+              <a:ext uri="{FF2B5EF4-FFF2-40B4-BE49-F238E27FC236}">
+                <a16:creationId xmlns:a16="http://schemas.microsoft.com/office/drawing/2014/main" id="{FE1CFCBF-2482-494A-BCA2-FE1883D84E49}"/>
+              </a:ext>
+            </a:extLst>
+          </p:cNvPr>
+          <p:cNvPicPr>
+            <a:picLocks noChangeAspect="1"/>
+          </p:cNvPicPr>
+          <p:nvPr/>
+        </p:nvPicPr>
+        <p:blipFill>
+          <a:blip r:embed="rId3"/>
+          <a:stretch>
+            <a:fillRect/>
+          </a:stretch>
+        </p:blipFill>
+        <p:spPr>
+          <a:xfrm>
+            <a:off x="1090864" y="1746930"/>
+            <a:ext cx="4780547" cy="4773433"/>
+          </a:xfrm>
+          <a:prstGeom prst="rect">
+            <a:avLst/>
+          </a:prstGeom>
+        </p:spPr>
+      </p:pic>
+    </p:spTree>
+    <p:extLst>
+      <p:ext uri="{BB962C8B-B14F-4D97-AF65-F5344CB8AC3E}">
+        <p14:creationId xmlns:p14="http://schemas.microsoft.com/office/powerpoint/2010/main" val="4121614044"/>
+      </p:ext>
+    </p:extLst>
+  </p:cSld>
+  <p:clrMapOvr>
+    <a:masterClrMapping/>
+  </p:clrMapOvr>
+</p:sld>
+</file>
+
+<file path=ppt/slides/slide11.xml><?xml version="1.0" encoding="utf-8"?>
+<p:sld xmlns:a="http://schemas.openxmlformats.org/drawingml/2006/main" xmlns:r="http://schemas.openxmlformats.org/officeDocument/2006/relationships" xmlns:p="http://schemas.openxmlformats.org/presentationml/2006/main">
+  <p:cSld>
+    <p:spTree>
+      <p:nvGrpSpPr>
+        <p:cNvPr id="1" name=""/>
+        <p:cNvGrpSpPr/>
+        <p:nvPr/>
+      </p:nvGrpSpPr>
+      <p:grpSpPr>
+        <a:xfrm>
+          <a:off x="0" y="0"/>
+          <a:ext cx="0" cy="0"/>
+          <a:chOff x="0" y="0"/>
+          <a:chExt cx="0" cy="0"/>
+        </a:xfrm>
+      </p:grpSpPr>
+      <p:sp>
+        <p:nvSpPr>
           <p:cNvPr id="2" name="Title 1">
             <a:extLst>
               <a:ext uri="{FF2B5EF4-FFF2-40B4-BE49-F238E27FC236}">
@@ -3523,7 +3677,7 @@
 </p:sld>
 </file>
 
-<file path=ppt/slides/slide11.xml><?xml version="1.0" encoding="utf-8"?>
+<file path=ppt/slides/slide12.xml><?xml version="1.0" encoding="utf-8"?>
 <p:sld xmlns:a="http://schemas.openxmlformats.org/drawingml/2006/main" xmlns:r="http://schemas.openxmlformats.org/officeDocument/2006/relationships" xmlns:p="http://schemas.openxmlformats.org/presentationml/2006/main">
   <p:cSld>
     <p:spTree>
@@ -3658,7 +3812,7 @@
 </p:sld>
 </file>
 
-<file path=ppt/slides/slide12.xml><?xml version="1.0" encoding="utf-8"?>
+<file path=ppt/slides/slide13.xml><?xml version="1.0" encoding="utf-8"?>
 <p:sld xmlns:a="http://schemas.openxmlformats.org/drawingml/2006/main" xmlns:r="http://schemas.openxmlformats.org/officeDocument/2006/relationships" xmlns:p="http://schemas.openxmlformats.org/presentationml/2006/main">
   <p:cSld>
     <p:spTree>
@@ -4825,74 +4979,300 @@
       </p:grpSpPr>
       <p:sp>
         <p:nvSpPr>
-          <p:cNvPr id="2" name="Title 1">
-            <a:extLst>
-              <a:ext uri="{FF2B5EF4-FFF2-40B4-BE49-F238E27FC236}">
-                <a16:creationId xmlns:a16="http://schemas.microsoft.com/office/drawing/2014/main" id="{AC810914-AD54-43B8-820D-EE5138A6945E}"/>
-              </a:ext>
-            </a:extLst>
-          </p:cNvPr>
-          <p:cNvSpPr>
-            <a:spLocks noGrp="1"/>
-          </p:cNvSpPr>
-          <p:nvPr>
-            <p:ph type="title"/>
-          </p:nvPr>
-        </p:nvSpPr>
-        <p:spPr/>
-        <p:txBody>
-          <a:bodyPr/>
+          <p:cNvPr id="7" name="Content Placeholder 2">
+            <a:extLst>
+              <a:ext uri="{FF2B5EF4-FFF2-40B4-BE49-F238E27FC236}">
+                <a16:creationId xmlns:a16="http://schemas.microsoft.com/office/drawing/2014/main" id="{BA17D511-6CBB-4EF6-B384-C001D5C058B8}"/>
+              </a:ext>
+            </a:extLst>
+          </p:cNvPr>
+          <p:cNvSpPr>
+            <a:spLocks noGrp="1"/>
+          </p:cNvSpPr>
+          <p:nvPr>
+            <p:ph idx="1"/>
+          </p:nvPr>
+        </p:nvSpPr>
+        <p:spPr>
+          <a:xfrm>
+            <a:off x="1110916" y="5807027"/>
+            <a:ext cx="3621505" cy="706820"/>
+          </a:xfrm>
+        </p:spPr>
+        <p:txBody>
+          <a:bodyPr>
+            <a:normAutofit fontScale="92500" lnSpcReduction="20000"/>
+          </a:bodyPr>
           <a:lstStyle/>
           <a:p>
             <a:r>
               <a:rPr lang="en-US" dirty="0"/>
-              <a:t>Interspecific body sizes -CWM</a:t>
-            </a:r>
-          </a:p>
-        </p:txBody>
-      </p:sp>
-      <p:sp>
-        <p:nvSpPr>
-          <p:cNvPr id="3" name="Content Placeholder 2">
-            <a:extLst>
-              <a:ext uri="{FF2B5EF4-FFF2-40B4-BE49-F238E27FC236}">
-                <a16:creationId xmlns:a16="http://schemas.microsoft.com/office/drawing/2014/main" id="{E406F015-EF75-48DD-81CC-1884EA85CA00}"/>
-              </a:ext>
-            </a:extLst>
-          </p:cNvPr>
-          <p:cNvSpPr>
-            <a:spLocks noGrp="1"/>
-          </p:cNvSpPr>
-          <p:nvPr>
-            <p:ph idx="1"/>
-          </p:nvPr>
-        </p:nvSpPr>
-        <p:spPr/>
-        <p:txBody>
-          <a:bodyPr/>
-          <a:lstStyle/>
-          <a:p>
-            <a:r>
-              <a:rPr lang="sv-SE" dirty="0"/>
-              <a:t>lmer(CWM ~ + DOY + (1|site)</a:t>
-            </a:r>
-          </a:p>
-          <a:p>
-            <a:endParaRPr lang="sv-SE" dirty="0"/>
-          </a:p>
-          <a:p>
-            <a:r>
-              <a:rPr lang="sv-SE" dirty="0"/>
-              <a:t>Sig effects: + yr and + DOY</a:t>
+              <a:t>Sig effects: DOY, </a:t>
+            </a:r>
+            <a:r>
+              <a:rPr lang="en-US" dirty="0" smtClean="0"/>
+              <a:t>Adult/Juvenile, Site</a:t>
             </a:r>
             <a:endParaRPr lang="en-US" dirty="0"/>
           </a:p>
         </p:txBody>
       </p:sp>
+      <p:sp>
+        <p:nvSpPr>
+          <p:cNvPr id="8" name="Content Placeholder 2">
+            <a:extLst>
+              <a:ext uri="{FF2B5EF4-FFF2-40B4-BE49-F238E27FC236}">
+                <a16:creationId xmlns:a16="http://schemas.microsoft.com/office/drawing/2014/main" id="{6CE9748D-2C62-4C70-8F62-55B0E17F5067}"/>
+              </a:ext>
+            </a:extLst>
+          </p:cNvPr>
+          <p:cNvSpPr txBox="1">
+            <a:spLocks/>
+          </p:cNvSpPr>
+          <p:nvPr/>
+        </p:nvSpPr>
+        <p:spPr>
+          <a:xfrm>
+            <a:off x="6716972" y="5943601"/>
+            <a:ext cx="5475028" cy="706820"/>
+          </a:xfrm>
+          <a:prstGeom prst="rect">
+            <a:avLst/>
+          </a:prstGeom>
+        </p:spPr>
+        <p:txBody>
+          <a:bodyPr vert="horz" lIns="91440" tIns="45720" rIns="91440" bIns="45720" rtlCol="0">
+            <a:normAutofit fontScale="92500"/>
+          </a:bodyPr>
+          <a:lstStyle>
+            <a:lvl1pPr marL="228600" indent="-228600" algn="l" defTabSz="914400" rtl="0" eaLnBrk="1" latinLnBrk="0" hangingPunct="1">
+              <a:lnSpc>
+                <a:spcPct val="90000"/>
+              </a:lnSpc>
+              <a:spcBef>
+                <a:spcPts val="1000"/>
+              </a:spcBef>
+              <a:buFont typeface="Arial" panose="020B0604020202020204" pitchFamily="34" charset="0"/>
+              <a:buChar char="•"/>
+              <a:defRPr sz="2800" kern="1200">
+                <a:solidFill>
+                  <a:schemeClr val="tx1"/>
+                </a:solidFill>
+                <a:latin typeface="+mn-lt"/>
+                <a:ea typeface="+mn-ea"/>
+                <a:cs typeface="+mn-cs"/>
+              </a:defRPr>
+            </a:lvl1pPr>
+            <a:lvl2pPr marL="685800" indent="-228600" algn="l" defTabSz="914400" rtl="0" eaLnBrk="1" latinLnBrk="0" hangingPunct="1">
+              <a:lnSpc>
+                <a:spcPct val="90000"/>
+              </a:lnSpc>
+              <a:spcBef>
+                <a:spcPts val="500"/>
+              </a:spcBef>
+              <a:buFont typeface="Arial" panose="020B0604020202020204" pitchFamily="34" charset="0"/>
+              <a:buChar char="•"/>
+              <a:defRPr sz="2400" kern="1200">
+                <a:solidFill>
+                  <a:schemeClr val="tx1"/>
+                </a:solidFill>
+                <a:latin typeface="+mn-lt"/>
+                <a:ea typeface="+mn-ea"/>
+                <a:cs typeface="+mn-cs"/>
+              </a:defRPr>
+            </a:lvl2pPr>
+            <a:lvl3pPr marL="1143000" indent="-228600" algn="l" defTabSz="914400" rtl="0" eaLnBrk="1" latinLnBrk="0" hangingPunct="1">
+              <a:lnSpc>
+                <a:spcPct val="90000"/>
+              </a:lnSpc>
+              <a:spcBef>
+                <a:spcPts val="500"/>
+              </a:spcBef>
+              <a:buFont typeface="Arial" panose="020B0604020202020204" pitchFamily="34" charset="0"/>
+              <a:buChar char="•"/>
+              <a:defRPr sz="2000" kern="1200">
+                <a:solidFill>
+                  <a:schemeClr val="tx1"/>
+                </a:solidFill>
+                <a:latin typeface="+mn-lt"/>
+                <a:ea typeface="+mn-ea"/>
+                <a:cs typeface="+mn-cs"/>
+              </a:defRPr>
+            </a:lvl3pPr>
+            <a:lvl4pPr marL="1600200" indent="-228600" algn="l" defTabSz="914400" rtl="0" eaLnBrk="1" latinLnBrk="0" hangingPunct="1">
+              <a:lnSpc>
+                <a:spcPct val="90000"/>
+              </a:lnSpc>
+              <a:spcBef>
+                <a:spcPts val="500"/>
+              </a:spcBef>
+              <a:buFont typeface="Arial" panose="020B0604020202020204" pitchFamily="34" charset="0"/>
+              <a:buChar char="•"/>
+              <a:defRPr sz="1800" kern="1200">
+                <a:solidFill>
+                  <a:schemeClr val="tx1"/>
+                </a:solidFill>
+                <a:latin typeface="+mn-lt"/>
+                <a:ea typeface="+mn-ea"/>
+                <a:cs typeface="+mn-cs"/>
+              </a:defRPr>
+            </a:lvl4pPr>
+            <a:lvl5pPr marL="2057400" indent="-228600" algn="l" defTabSz="914400" rtl="0" eaLnBrk="1" latinLnBrk="0" hangingPunct="1">
+              <a:lnSpc>
+                <a:spcPct val="90000"/>
+              </a:lnSpc>
+              <a:spcBef>
+                <a:spcPts val="500"/>
+              </a:spcBef>
+              <a:buFont typeface="Arial" panose="020B0604020202020204" pitchFamily="34" charset="0"/>
+              <a:buChar char="•"/>
+              <a:defRPr sz="1800" kern="1200">
+                <a:solidFill>
+                  <a:schemeClr val="tx1"/>
+                </a:solidFill>
+                <a:latin typeface="+mn-lt"/>
+                <a:ea typeface="+mn-ea"/>
+                <a:cs typeface="+mn-cs"/>
+              </a:defRPr>
+            </a:lvl5pPr>
+            <a:lvl6pPr marL="2514600" indent="-228600" algn="l" defTabSz="914400" rtl="0" eaLnBrk="1" latinLnBrk="0" hangingPunct="1">
+              <a:lnSpc>
+                <a:spcPct val="90000"/>
+              </a:lnSpc>
+              <a:spcBef>
+                <a:spcPts val="500"/>
+              </a:spcBef>
+              <a:buFont typeface="Arial" panose="020B0604020202020204" pitchFamily="34" charset="0"/>
+              <a:buChar char="•"/>
+              <a:defRPr sz="1800" kern="1200">
+                <a:solidFill>
+                  <a:schemeClr val="tx1"/>
+                </a:solidFill>
+                <a:latin typeface="+mn-lt"/>
+                <a:ea typeface="+mn-ea"/>
+                <a:cs typeface="+mn-cs"/>
+              </a:defRPr>
+            </a:lvl6pPr>
+            <a:lvl7pPr marL="2971800" indent="-228600" algn="l" defTabSz="914400" rtl="0" eaLnBrk="1" latinLnBrk="0" hangingPunct="1">
+              <a:lnSpc>
+                <a:spcPct val="90000"/>
+              </a:lnSpc>
+              <a:spcBef>
+                <a:spcPts val="500"/>
+              </a:spcBef>
+              <a:buFont typeface="Arial" panose="020B0604020202020204" pitchFamily="34" charset="0"/>
+              <a:buChar char="•"/>
+              <a:defRPr sz="1800" kern="1200">
+                <a:solidFill>
+                  <a:schemeClr val="tx1"/>
+                </a:solidFill>
+                <a:latin typeface="+mn-lt"/>
+                <a:ea typeface="+mn-ea"/>
+                <a:cs typeface="+mn-cs"/>
+              </a:defRPr>
+            </a:lvl7pPr>
+            <a:lvl8pPr marL="3429000" indent="-228600" algn="l" defTabSz="914400" rtl="0" eaLnBrk="1" latinLnBrk="0" hangingPunct="1">
+              <a:lnSpc>
+                <a:spcPct val="90000"/>
+              </a:lnSpc>
+              <a:spcBef>
+                <a:spcPts val="500"/>
+              </a:spcBef>
+              <a:buFont typeface="Arial" panose="020B0604020202020204" pitchFamily="34" charset="0"/>
+              <a:buChar char="•"/>
+              <a:defRPr sz="1800" kern="1200">
+                <a:solidFill>
+                  <a:schemeClr val="tx1"/>
+                </a:solidFill>
+                <a:latin typeface="+mn-lt"/>
+                <a:ea typeface="+mn-ea"/>
+                <a:cs typeface="+mn-cs"/>
+              </a:defRPr>
+            </a:lvl8pPr>
+            <a:lvl9pPr marL="3886200" indent="-228600" algn="l" defTabSz="914400" rtl="0" eaLnBrk="1" latinLnBrk="0" hangingPunct="1">
+              <a:lnSpc>
+                <a:spcPct val="90000"/>
+              </a:lnSpc>
+              <a:spcBef>
+                <a:spcPts val="500"/>
+              </a:spcBef>
+              <a:buFont typeface="Arial" panose="020B0604020202020204" pitchFamily="34" charset="0"/>
+              <a:buChar char="•"/>
+              <a:defRPr sz="1800" kern="1200">
+                <a:solidFill>
+                  <a:schemeClr val="tx1"/>
+                </a:solidFill>
+                <a:latin typeface="+mn-lt"/>
+                <a:ea typeface="+mn-ea"/>
+                <a:cs typeface="+mn-cs"/>
+              </a:defRPr>
+            </a:lvl9pPr>
+          </a:lstStyle>
+          <a:p>
+            <a:r>
+              <a:rPr lang="en-US" dirty="0"/>
+              <a:t>Sig effects: </a:t>
+            </a:r>
+            <a:r>
+              <a:rPr lang="en-US" dirty="0"/>
+              <a:t>DOY, Adult/Juvenile, Site</a:t>
+            </a:r>
+            <a:endParaRPr lang="en-US" dirty="0"/>
+          </a:p>
+        </p:txBody>
+      </p:sp>
+      <p:pic>
+        <p:nvPicPr>
+          <p:cNvPr id="5" name="Picture 4"/>
+          <p:cNvPicPr>
+            <a:picLocks noChangeAspect="1"/>
+          </p:cNvPicPr>
+          <p:nvPr/>
+        </p:nvPicPr>
+        <p:blipFill>
+          <a:blip r:embed="rId2"/>
+          <a:stretch>
+            <a:fillRect/>
+          </a:stretch>
+        </p:blipFill>
+        <p:spPr>
+          <a:xfrm>
+            <a:off x="6343610" y="2182053"/>
+            <a:ext cx="5704877" cy="3624974"/>
+          </a:xfrm>
+          <a:prstGeom prst="rect">
+            <a:avLst/>
+          </a:prstGeom>
+        </p:spPr>
+      </p:pic>
+      <p:pic>
+        <p:nvPicPr>
+          <p:cNvPr id="6" name="Picture 5"/>
+          <p:cNvPicPr>
+            <a:picLocks noChangeAspect="1"/>
+          </p:cNvPicPr>
+          <p:nvPr/>
+        </p:nvPicPr>
+        <p:blipFill>
+          <a:blip r:embed="rId3"/>
+          <a:stretch>
+            <a:fillRect/>
+          </a:stretch>
+        </p:blipFill>
+        <p:spPr>
+          <a:xfrm>
+            <a:off x="151826" y="1"/>
+            <a:ext cx="6253352" cy="3973484"/>
+          </a:xfrm>
+          <a:prstGeom prst="rect">
+            <a:avLst/>
+          </a:prstGeom>
+        </p:spPr>
+      </p:pic>
     </p:spTree>
     <p:extLst>
       <p:ext uri="{BB962C8B-B14F-4D97-AF65-F5344CB8AC3E}">
-        <p14:creationId xmlns:p14="http://schemas.microsoft.com/office/powerpoint/2010/main" val="1361340937"/>
+        <p14:creationId xmlns:p14="http://schemas.microsoft.com/office/powerpoint/2010/main" val="1646294678"/>
       </p:ext>
     </p:extLst>
   </p:cSld>
@@ -4919,72 +5299,12 @@
           <a:chExt cx="0" cy="0"/>
         </a:xfrm>
       </p:grpSpPr>
-      <p:pic>
-        <p:nvPicPr>
-          <p:cNvPr id="4" name="Picture 3">
-            <a:extLst>
-              <a:ext uri="{FF2B5EF4-FFF2-40B4-BE49-F238E27FC236}">
-                <a16:creationId xmlns:a16="http://schemas.microsoft.com/office/drawing/2014/main" id="{47FD6EDB-C0F1-480A-8DE7-45FB0CE92D0D}"/>
-              </a:ext>
-            </a:extLst>
-          </p:cNvPr>
-          <p:cNvPicPr>
-            <a:picLocks noChangeAspect="1"/>
-          </p:cNvPicPr>
-          <p:nvPr/>
-        </p:nvPicPr>
-        <p:blipFill>
-          <a:blip r:embed="rId2"/>
-          <a:stretch>
-            <a:fillRect/>
-          </a:stretch>
-        </p:blipFill>
-        <p:spPr>
-          <a:xfrm>
-            <a:off x="673767" y="1675658"/>
-            <a:ext cx="4892843" cy="4885562"/>
-          </a:xfrm>
-          <a:prstGeom prst="rect">
-            <a:avLst/>
-          </a:prstGeom>
-        </p:spPr>
-      </p:pic>
-      <p:pic>
-        <p:nvPicPr>
-          <p:cNvPr id="5" name="Picture 4">
-            <a:extLst>
-              <a:ext uri="{FF2B5EF4-FFF2-40B4-BE49-F238E27FC236}">
-                <a16:creationId xmlns:a16="http://schemas.microsoft.com/office/drawing/2014/main" id="{311E8240-12DD-4871-B8CD-5A4285F7C6E6}"/>
-              </a:ext>
-            </a:extLst>
-          </p:cNvPr>
-          <p:cNvPicPr>
-            <a:picLocks noChangeAspect="1"/>
-          </p:cNvPicPr>
-          <p:nvPr/>
-        </p:nvPicPr>
-        <p:blipFill>
-          <a:blip r:embed="rId3"/>
-          <a:stretch>
-            <a:fillRect/>
-          </a:stretch>
-        </p:blipFill>
-        <p:spPr>
-          <a:xfrm>
-            <a:off x="6417454" y="1797465"/>
-            <a:ext cx="4770853" cy="4763754"/>
-          </a:xfrm>
-          <a:prstGeom prst="rect">
-            <a:avLst/>
-          </a:prstGeom>
-        </p:spPr>
-      </p:pic>
-      <p:sp>
-        <p:nvSpPr>
-          <p:cNvPr id="6" name="Title 1">
-            <a:extLst>
-              <a:ext uri="{FF2B5EF4-FFF2-40B4-BE49-F238E27FC236}">
-                <a16:creationId xmlns:a16="http://schemas.microsoft.com/office/drawing/2014/main" id="{4D54428A-1E66-46CC-A5F5-26B9B67014AD}"/>
+      <p:sp>
+        <p:nvSpPr>
+          <p:cNvPr id="2" name="Title 1">
+            <a:extLst>
+              <a:ext uri="{FF2B5EF4-FFF2-40B4-BE49-F238E27FC236}">
+                <a16:creationId xmlns:a16="http://schemas.microsoft.com/office/drawing/2014/main" id="{AC810914-AD54-43B8-820D-EE5138A6945E}"/>
               </a:ext>
             </a:extLst>
           </p:cNvPr>
@@ -4995,31 +5315,60 @@
             <p:ph type="title"/>
           </p:nvPr>
         </p:nvSpPr>
-        <p:spPr>
-          <a:xfrm>
-            <a:off x="838200" y="365125"/>
-            <a:ext cx="10515600" cy="1325563"/>
-          </a:xfrm>
-        </p:spPr>
-        <p:txBody>
-          <a:bodyPr/>
-          <a:lstStyle/>
-          <a:p>
-            <a:r>
-              <a:rPr lang="en-US" dirty="0" err="1"/>
-              <a:t>Aubach</a:t>
-            </a:r>
+        <p:spPr/>
+        <p:txBody>
+          <a:bodyPr/>
+          <a:lstStyle/>
+          <a:p>
             <a:r>
               <a:rPr lang="en-US" dirty="0"/>
-              <a:t> and Bieber CWMs</a:t>
-            </a:r>
+              <a:t>Interspecific body sizes -CWM</a:t>
+            </a:r>
+          </a:p>
+        </p:txBody>
+      </p:sp>
+      <p:sp>
+        <p:nvSpPr>
+          <p:cNvPr id="3" name="Content Placeholder 2">
+            <a:extLst>
+              <a:ext uri="{FF2B5EF4-FFF2-40B4-BE49-F238E27FC236}">
+                <a16:creationId xmlns:a16="http://schemas.microsoft.com/office/drawing/2014/main" id="{E406F015-EF75-48DD-81CC-1884EA85CA00}"/>
+              </a:ext>
+            </a:extLst>
+          </p:cNvPr>
+          <p:cNvSpPr>
+            <a:spLocks noGrp="1"/>
+          </p:cNvSpPr>
+          <p:nvPr>
+            <p:ph idx="1"/>
+          </p:nvPr>
+        </p:nvSpPr>
+        <p:spPr/>
+        <p:txBody>
+          <a:bodyPr/>
+          <a:lstStyle/>
+          <a:p>
+            <a:r>
+              <a:rPr lang="sv-SE" dirty="0"/>
+              <a:t>lmer(CWM ~ + DOY + (1|site)</a:t>
+            </a:r>
+          </a:p>
+          <a:p>
+            <a:endParaRPr lang="sv-SE" dirty="0"/>
+          </a:p>
+          <a:p>
+            <a:r>
+              <a:rPr lang="sv-SE" dirty="0"/>
+              <a:t>Sig effects: + yr and + DOY</a:t>
+            </a:r>
+            <a:endParaRPr lang="en-US" dirty="0"/>
           </a:p>
         </p:txBody>
       </p:sp>
     </p:spTree>
     <p:extLst>
       <p:ext uri="{BB962C8B-B14F-4D97-AF65-F5344CB8AC3E}">
-        <p14:creationId xmlns:p14="http://schemas.microsoft.com/office/powerpoint/2010/main" val="2933890742"/>
+        <p14:creationId xmlns:p14="http://schemas.microsoft.com/office/powerpoint/2010/main" val="1361340937"/>
       </p:ext>
     </p:extLst>
   </p:cSld>
@@ -5046,44 +5395,12 @@
           <a:chExt cx="0" cy="0"/>
         </a:xfrm>
       </p:grpSpPr>
-      <p:sp>
-        <p:nvSpPr>
-          <p:cNvPr id="2" name="Title 1">
-            <a:extLst>
-              <a:ext uri="{FF2B5EF4-FFF2-40B4-BE49-F238E27FC236}">
-                <a16:creationId xmlns:a16="http://schemas.microsoft.com/office/drawing/2014/main" id="{E4FE1FC2-421E-4836-9843-9DB5A0C63009}"/>
-              </a:ext>
-            </a:extLst>
-          </p:cNvPr>
-          <p:cNvSpPr>
-            <a:spLocks noGrp="1"/>
-          </p:cNvSpPr>
-          <p:nvPr>
-            <p:ph type="title"/>
-          </p:nvPr>
-        </p:nvSpPr>
-        <p:spPr/>
-        <p:txBody>
-          <a:bodyPr/>
-          <a:lstStyle/>
-          <a:p>
-            <a:r>
-              <a:rPr lang="en-US" dirty="0" err="1"/>
-              <a:t>Kinzig</a:t>
-            </a:r>
-            <a:r>
-              <a:rPr lang="en-US" dirty="0"/>
-              <a:t> CWMs</a:t>
-            </a:r>
-          </a:p>
-        </p:txBody>
-      </p:sp>
       <p:pic>
         <p:nvPicPr>
           <p:cNvPr id="4" name="Picture 3">
             <a:extLst>
               <a:ext uri="{FF2B5EF4-FFF2-40B4-BE49-F238E27FC236}">
-                <a16:creationId xmlns:a16="http://schemas.microsoft.com/office/drawing/2014/main" id="{4B0E4244-4637-4B8F-AA65-00FE7FBD622C}"/>
+                <a16:creationId xmlns:a16="http://schemas.microsoft.com/office/drawing/2014/main" id="{47FD6EDB-C0F1-480A-8DE7-45FB0CE92D0D}"/>
               </a:ext>
             </a:extLst>
           </p:cNvPr>
@@ -5100,8 +5417,8 @@
         </p:blipFill>
         <p:spPr>
           <a:xfrm>
-            <a:off x="521848" y="1491319"/>
-            <a:ext cx="5173100" cy="5165402"/>
+            <a:off x="673767" y="1675658"/>
+            <a:ext cx="4892843" cy="4885562"/>
           </a:xfrm>
           <a:prstGeom prst="rect">
             <a:avLst/>
@@ -5113,7 +5430,7 @@
           <p:cNvPr id="5" name="Picture 4">
             <a:extLst>
               <a:ext uri="{FF2B5EF4-FFF2-40B4-BE49-F238E27FC236}">
-                <a16:creationId xmlns:a16="http://schemas.microsoft.com/office/drawing/2014/main" id="{0C3C29BD-22E5-470B-B6C4-6E8151B71E7C}"/>
+                <a16:creationId xmlns:a16="http://schemas.microsoft.com/office/drawing/2014/main" id="{311E8240-12DD-4871-B8CD-5A4285F7C6E6}"/>
               </a:ext>
             </a:extLst>
           </p:cNvPr>
@@ -5130,18 +5447,55 @@
         </p:blipFill>
         <p:spPr>
           <a:xfrm>
-            <a:off x="6297471" y="1491319"/>
-            <a:ext cx="5260866" cy="5253037"/>
+            <a:off x="6417454" y="1797465"/>
+            <a:ext cx="4770853" cy="4763754"/>
           </a:xfrm>
           <a:prstGeom prst="rect">
             <a:avLst/>
           </a:prstGeom>
         </p:spPr>
       </p:pic>
+      <p:sp>
+        <p:nvSpPr>
+          <p:cNvPr id="6" name="Title 1">
+            <a:extLst>
+              <a:ext uri="{FF2B5EF4-FFF2-40B4-BE49-F238E27FC236}">
+                <a16:creationId xmlns:a16="http://schemas.microsoft.com/office/drawing/2014/main" id="{4D54428A-1E66-46CC-A5F5-26B9B67014AD}"/>
+              </a:ext>
+            </a:extLst>
+          </p:cNvPr>
+          <p:cNvSpPr>
+            <a:spLocks noGrp="1"/>
+          </p:cNvSpPr>
+          <p:nvPr>
+            <p:ph type="title"/>
+          </p:nvPr>
+        </p:nvSpPr>
+        <p:spPr>
+          <a:xfrm>
+            <a:off x="838200" y="365125"/>
+            <a:ext cx="10515600" cy="1325563"/>
+          </a:xfrm>
+        </p:spPr>
+        <p:txBody>
+          <a:bodyPr/>
+          <a:lstStyle/>
+          <a:p>
+            <a:r>
+              <a:rPr lang="en-US" dirty="0" err="1"/>
+              <a:t>Aubach</a:t>
+            </a:r>
+            <a:r>
+              <a:rPr lang="en-US" dirty="0"/>
+              <a:t> and Bieber CWMs</a:t>
+            </a:r>
+          </a:p>
+        </p:txBody>
+      </p:sp>
     </p:spTree>
     <p:extLst>
       <p:ext uri="{BB962C8B-B14F-4D97-AF65-F5344CB8AC3E}">
-        <p14:creationId xmlns:p14="http://schemas.microsoft.com/office/powerpoint/2010/main" val="4129440310"/>
+        <p14:creationId xmlns:p14="http://schemas.microsoft.com/office/powerpoint/2010/main" val="2933890742"/>
       </p:ext>
     </p:extLst>
   </p:cSld>
@@ -5170,68 +5524,42 @@
       </p:grpSpPr>
       <p:sp>
         <p:nvSpPr>
-          <p:cNvPr id="4" name="Title 1">
-            <a:extLst>
-              <a:ext uri="{FF2B5EF4-FFF2-40B4-BE49-F238E27FC236}">
-                <a16:creationId xmlns:a16="http://schemas.microsoft.com/office/drawing/2014/main" id="{5008CCB4-C1A5-434E-BD0C-12975ABE4F13}"/>
-              </a:ext>
-            </a:extLst>
-          </p:cNvPr>
-          <p:cNvSpPr txBox="1">
-            <a:spLocks/>
-          </p:cNvSpPr>
-          <p:nvPr/>
-        </p:nvSpPr>
-        <p:spPr>
-          <a:xfrm>
-            <a:off x="934453" y="0"/>
-            <a:ext cx="10515600" cy="1325563"/>
-          </a:xfrm>
-          <a:prstGeom prst="rect">
-            <a:avLst/>
-          </a:prstGeom>
-        </p:spPr>
-        <p:txBody>
-          <a:bodyPr vert="horz" lIns="91440" tIns="45720" rIns="91440" bIns="45720" rtlCol="0" anchor="ctr">
-            <a:normAutofit/>
-          </a:bodyPr>
-          <a:lstStyle>
-            <a:lvl1pPr algn="l" defTabSz="914400" rtl="0" eaLnBrk="1" latinLnBrk="0" hangingPunct="1">
-              <a:lnSpc>
-                <a:spcPct val="90000"/>
-              </a:lnSpc>
-              <a:spcBef>
-                <a:spcPct val="0"/>
-              </a:spcBef>
-              <a:buNone/>
-              <a:defRPr sz="4400" kern="1200">
-                <a:solidFill>
-                  <a:schemeClr val="tx1"/>
-                </a:solidFill>
-                <a:latin typeface="+mj-lt"/>
-                <a:ea typeface="+mj-ea"/>
-                <a:cs typeface="+mj-cs"/>
-              </a:defRPr>
-            </a:lvl1pPr>
-          </a:lstStyle>
+          <p:cNvPr id="2" name="Title 1">
+            <a:extLst>
+              <a:ext uri="{FF2B5EF4-FFF2-40B4-BE49-F238E27FC236}">
+                <a16:creationId xmlns:a16="http://schemas.microsoft.com/office/drawing/2014/main" id="{E4FE1FC2-421E-4836-9843-9DB5A0C63009}"/>
+              </a:ext>
+            </a:extLst>
+          </p:cNvPr>
+          <p:cNvSpPr>
+            <a:spLocks noGrp="1"/>
+          </p:cNvSpPr>
+          <p:nvPr>
+            <p:ph type="title"/>
+          </p:nvPr>
+        </p:nvSpPr>
+        <p:spPr/>
+        <p:txBody>
+          <a:bodyPr/>
+          <a:lstStyle/>
           <a:p>
             <a:r>
               <a:rPr lang="en-US" dirty="0" err="1"/>
-              <a:t>Aubach</a:t>
+              <a:t>Kinzig</a:t>
             </a:r>
             <a:r>
               <a:rPr lang="en-US" dirty="0"/>
-              <a:t> and Bieber Abundances</a:t>
+              <a:t> CWMs</a:t>
             </a:r>
           </a:p>
         </p:txBody>
       </p:sp>
       <p:pic>
         <p:nvPicPr>
-          <p:cNvPr id="6" name="Picture 5">
-            <a:extLst>
-              <a:ext uri="{FF2B5EF4-FFF2-40B4-BE49-F238E27FC236}">
-                <a16:creationId xmlns:a16="http://schemas.microsoft.com/office/drawing/2014/main" id="{ACF991C9-DCD7-491C-AFD5-66BDF10612BB}"/>
+          <p:cNvPr id="4" name="Picture 3">
+            <a:extLst>
+              <a:ext uri="{FF2B5EF4-FFF2-40B4-BE49-F238E27FC236}">
+                <a16:creationId xmlns:a16="http://schemas.microsoft.com/office/drawing/2014/main" id="{4B0E4244-4637-4B8F-AA65-00FE7FBD622C}"/>
               </a:ext>
             </a:extLst>
           </p:cNvPr>
@@ -5248,8 +5576,8 @@
         </p:blipFill>
         <p:spPr>
           <a:xfrm>
-            <a:off x="6522099" y="1553333"/>
-            <a:ext cx="4780547" cy="4773433"/>
+            <a:off x="521848" y="1491319"/>
+            <a:ext cx="5173100" cy="5165402"/>
           </a:xfrm>
           <a:prstGeom prst="rect">
             <a:avLst/>
@@ -5258,10 +5586,10 @@
       </p:pic>
       <p:pic>
         <p:nvPicPr>
-          <p:cNvPr id="7" name="Picture 6">
-            <a:extLst>
-              <a:ext uri="{FF2B5EF4-FFF2-40B4-BE49-F238E27FC236}">
-                <a16:creationId xmlns:a16="http://schemas.microsoft.com/office/drawing/2014/main" id="{FE1CFCBF-2482-494A-BCA2-FE1883D84E49}"/>
+          <p:cNvPr id="5" name="Picture 4">
+            <a:extLst>
+              <a:ext uri="{FF2B5EF4-FFF2-40B4-BE49-F238E27FC236}">
+                <a16:creationId xmlns:a16="http://schemas.microsoft.com/office/drawing/2014/main" id="{0C3C29BD-22E5-470B-B6C4-6E8151B71E7C}"/>
               </a:ext>
             </a:extLst>
           </p:cNvPr>
@@ -5278,8 +5606,8 @@
         </p:blipFill>
         <p:spPr>
           <a:xfrm>
-            <a:off x="1090864" y="1746930"/>
-            <a:ext cx="4780547" cy="4773433"/>
+            <a:off x="6297471" y="1491319"/>
+            <a:ext cx="5260866" cy="5253037"/>
           </a:xfrm>
           <a:prstGeom prst="rect">
             <a:avLst/>
@@ -5289,7 +5617,7 @@
     </p:spTree>
     <p:extLst>
       <p:ext uri="{BB962C8B-B14F-4D97-AF65-F5344CB8AC3E}">
-        <p14:creationId xmlns:p14="http://schemas.microsoft.com/office/powerpoint/2010/main" val="4121614044"/>
+        <p14:creationId xmlns:p14="http://schemas.microsoft.com/office/powerpoint/2010/main" val="4129440310"/>
       </p:ext>
     </p:extLst>
   </p:cSld>

</xml_diff>